<commit_message>
Added graphs.py script, pdf and word updated
</commit_message>
<xml_diff>
--- a/DDPG AGENT U HALFCHEETAH OKRUŽENJU.pptx
+++ b/DDPG AGENT U HALFCHEETAH OKRUŽENJU.pptx
@@ -290,7 +290,7 @@
           <a:p>
             <a:fld id="{72EA7947-E287-4738-8C82-07CE4F01EF03}" type="datetime2">
               <a:rPr lang="en-US" smtClean="0"/>
-              <a:t>Saturday, August 29, 2020</a:t>
+              <a:t>Monday, August 31, 2020</a:t>
             </a:fld>
             <a:endParaRPr lang="en-US"/>
           </a:p>
@@ -1325,7 +1325,7 @@
           <a:p>
             <a:fld id="{EE2EBD84-71F4-4271-8C46-0D47C0A9B12E}" type="datetime2">
               <a:rPr lang="en-US" smtClean="0"/>
-              <a:t>Saturday, August 29, 2020</a:t>
+              <a:t>Monday, August 31, 2020</a:t>
             </a:fld>
             <a:endParaRPr lang="en-US"/>
           </a:p>
@@ -1536,7 +1536,7 @@
           <a:p>
             <a:fld id="{ABAE0CE1-F450-4107-B2CB-17B18F8A3F4A}" type="datetime2">
               <a:rPr lang="en-US" smtClean="0"/>
-              <a:t>Saturday, August 29, 2020</a:t>
+              <a:t>Monday, August 31, 2020</a:t>
             </a:fld>
             <a:endParaRPr lang="en-US"/>
           </a:p>
@@ -2199,7 +2199,7 @@
           <a:p>
             <a:fld id="{6FE8C025-CD7A-4966-867E-81CF82B15267}" type="datetime2">
               <a:rPr lang="en-US" smtClean="0"/>
-              <a:t>Saturday, August 29, 2020</a:t>
+              <a:t>Monday, August 31, 2020</a:t>
             </a:fld>
             <a:endParaRPr lang="en-US"/>
           </a:p>
@@ -2818,7 +2818,7 @@
           <a:p>
             <a:fld id="{FE809929-0719-4517-94D6-FDF7F99E70F6}" type="datetime2">
               <a:rPr lang="en-US" smtClean="0"/>
-              <a:t>Saturday, August 29, 2020</a:t>
+              <a:t>Monday, August 31, 2020</a:t>
             </a:fld>
             <a:endParaRPr lang="en-US"/>
           </a:p>
@@ -3933,7 +3933,7 @@
           <a:p>
             <a:fld id="{20E95673-5512-4AAA-9AEB-E00C61EC65D5}" type="datetime2">
               <a:rPr lang="en-US" smtClean="0"/>
-              <a:t>Saturday, August 29, 2020</a:t>
+              <a:t>Monday, August 31, 2020</a:t>
             </a:fld>
             <a:endParaRPr lang="en-US"/>
           </a:p>
@@ -4478,7 +4478,7 @@
           <a:p>
             <a:fld id="{C13138FA-2E87-4873-8BBA-13E447C9A99A}" type="datetime2">
               <a:rPr lang="en-US" smtClean="0"/>
-              <a:t>Saturday, August 29, 2020</a:t>
+              <a:t>Monday, August 31, 2020</a:t>
             </a:fld>
             <a:endParaRPr lang="en-US"/>
           </a:p>
@@ -4638,7 +4638,7 @@
           <a:p>
             <a:fld id="{D75BB40A-97BD-4BFB-B639-0BFF95FDE8B7}" type="datetime2">
               <a:rPr lang="en-US" smtClean="0"/>
-              <a:t>Saturday, August 29, 2020</a:t>
+              <a:t>Monday, August 31, 2020</a:t>
             </a:fld>
             <a:endParaRPr lang="en-US"/>
           </a:p>
@@ -5673,7 +5673,7 @@
           <a:p>
             <a:fld id="{9EE9E0E3-ECF6-4CFE-8698-AEFEBCECC3C0}" type="datetime2">
               <a:rPr lang="en-US" smtClean="0"/>
-              <a:t>Saturday, August 29, 2020</a:t>
+              <a:t>Monday, August 31, 2020</a:t>
             </a:fld>
             <a:endParaRPr lang="en-US"/>
           </a:p>
@@ -6317,7 +6317,7 @@
           <a:p>
             <a:fld id="{251462FC-960E-4740-921F-B36862979F21}" type="datetime2">
               <a:rPr lang="en-US" smtClean="0"/>
-              <a:t>Saturday, August 29, 2020</a:t>
+              <a:t>Monday, August 31, 2020</a:t>
             </a:fld>
             <a:endParaRPr lang="en-US"/>
           </a:p>
@@ -7079,7 +7079,7 @@
           <a:p>
             <a:fld id="{E50BC9E2-CB44-4C05-9BB5-496C18A241E0}" type="datetime2">
               <a:rPr lang="en-US" smtClean="0"/>
-              <a:t>Saturday, August 29, 2020</a:t>
+              <a:t>Monday, August 31, 2020</a:t>
             </a:fld>
             <a:endParaRPr lang="en-US"/>
           </a:p>
@@ -7330,7 +7330,7 @@
           <a:p>
             <a:fld id="{246CB39B-5F4C-4A7E-9BE3-AAFD45576D16}" type="datetime2">
               <a:rPr lang="en-US" smtClean="0"/>
-              <a:t>Saturday, August 29, 2020</a:t>
+              <a:t>Monday, August 31, 2020</a:t>
             </a:fld>
             <a:endParaRPr lang="en-US"/>
           </a:p>
@@ -10489,115 +10489,18 @@
         </p:spPr>
         <p:txBody>
           <a:bodyPr>
-            <a:normAutofit fontScale="85000" lnSpcReduction="20000"/>
+            <a:normAutofit/>
           </a:bodyPr>
           <a:lstStyle/>
+          <a:p>
+            <a:endParaRPr lang="hr-HR" dirty="0"/>
+          </a:p>
           <a:p>
             <a:pPr marL="285750" indent="-285750">
               <a:buFont typeface="Wingdings" panose="05000000000000000000" pitchFamily="2" charset="2"/>
               <a:buChar char="Ø"/>
             </a:pPr>
-            <a:r>
-              <a:rPr lang="hr-HR"/>
-              <a:t>Podržano učenje</a:t>
-            </a:r>
-          </a:p>
-          <a:p>
-            <a:pPr marL="285750" indent="-285750">
-              <a:buFont typeface="Wingdings" panose="05000000000000000000" pitchFamily="2" charset="2"/>
-              <a:buChar char="Ø"/>
-            </a:pPr>
-            <a:endParaRPr lang="hr-HR"/>
-          </a:p>
-          <a:p>
-            <a:pPr marL="285750" indent="-285750">
-              <a:buFont typeface="Wingdings" panose="05000000000000000000" pitchFamily="2" charset="2"/>
-              <a:buChar char="Ø"/>
-            </a:pPr>
-            <a:r>
-              <a:rPr lang="hr-HR"/>
-              <a:t>Duboko učenje</a:t>
-            </a:r>
-          </a:p>
-          <a:p>
-            <a:pPr marL="285750" indent="-285750">
-              <a:buFont typeface="Wingdings" panose="05000000000000000000" pitchFamily="2" charset="2"/>
-              <a:buChar char="Ø"/>
-            </a:pPr>
-            <a:endParaRPr lang="hr-HR"/>
-          </a:p>
-          <a:p>
-            <a:pPr marL="285750" indent="-285750">
-              <a:buFont typeface="Wingdings" panose="05000000000000000000" pitchFamily="2" charset="2"/>
-              <a:buChar char="Ø"/>
-            </a:pPr>
-            <a:r>
-              <a:rPr lang="hr-HR"/>
-              <a:t>Gradijentni spust</a:t>
-            </a:r>
-          </a:p>
-          <a:p>
-            <a:endParaRPr lang="hr-HR"/>
-          </a:p>
-          <a:p>
-            <a:pPr marL="285750" indent="-285750">
-              <a:buFont typeface="Wingdings" panose="05000000000000000000" pitchFamily="2" charset="2"/>
-              <a:buChar char="Ø"/>
-            </a:pPr>
-            <a:r>
-              <a:rPr lang="hr-HR" err="1"/>
-              <a:t>Actor-Critic</a:t>
-            </a:r>
-            <a:endParaRPr lang="hr-HR"/>
-          </a:p>
-          <a:p>
-            <a:pPr marL="285750" indent="-285750">
-              <a:buFont typeface="Wingdings" panose="05000000000000000000" pitchFamily="2" charset="2"/>
-              <a:buChar char="Ø"/>
-            </a:pPr>
-            <a:endParaRPr lang="hr-HR"/>
-          </a:p>
-          <a:p>
-            <a:pPr marL="285750" indent="-285750">
-              <a:buFont typeface="Wingdings" panose="05000000000000000000" pitchFamily="2" charset="2"/>
-              <a:buChar char="Ø"/>
-            </a:pPr>
-            <a:r>
-              <a:rPr lang="hr-HR"/>
-              <a:t>Off-</a:t>
-            </a:r>
-            <a:r>
-              <a:rPr lang="hr-HR" err="1"/>
-              <a:t>policy</a:t>
-            </a:r>
-            <a:endParaRPr lang="hr-HR"/>
-          </a:p>
-          <a:p>
-            <a:pPr marL="285750" indent="-285750">
-              <a:buFont typeface="Wingdings" panose="05000000000000000000" pitchFamily="2" charset="2"/>
-              <a:buChar char="Ø"/>
-            </a:pPr>
-            <a:endParaRPr lang="hr-HR"/>
-          </a:p>
-          <a:p>
-            <a:pPr marL="285750" indent="-285750">
-              <a:buFont typeface="Wingdings" panose="05000000000000000000" pitchFamily="2" charset="2"/>
-              <a:buChar char="Ø"/>
-            </a:pPr>
-            <a:r>
-              <a:rPr lang="hr-HR"/>
-              <a:t>Q-vrijednost i politika</a:t>
-            </a:r>
-          </a:p>
-          <a:p>
-            <a:endParaRPr lang="hr-HR"/>
-          </a:p>
-          <a:p>
-            <a:pPr marL="285750" indent="-285750">
-              <a:buFont typeface="Wingdings" panose="05000000000000000000" pitchFamily="2" charset="2"/>
-              <a:buChar char="Ø"/>
-            </a:pPr>
-            <a:endParaRPr lang="hr-HR"/>
+            <a:endParaRPr lang="hr-HR" dirty="0"/>
           </a:p>
         </p:txBody>
       </p:sp>
@@ -10668,7 +10571,7 @@
         </p:blipFill>
         <p:spPr>
           <a:xfrm>
-            <a:off x="3527573" y="2494334"/>
+            <a:off x="1391043" y="2512251"/>
             <a:ext cx="4196440" cy="2095030"/>
           </a:xfrm>
           <a:prstGeom prst="rect">
@@ -10721,7 +10624,7 @@
         </p:blipFill>
         <p:spPr>
           <a:xfrm>
-            <a:off x="7562863" y="2411520"/>
+            <a:off x="6296770" y="2446689"/>
             <a:ext cx="3794157" cy="2095030"/>
           </a:xfrm>
           <a:prstGeom prst="rect">
@@ -10758,7 +10661,7 @@
         </p:nvSpPr>
         <p:spPr>
           <a:xfrm>
-            <a:off x="4975225" y="1881388"/>
+            <a:off x="2784087" y="4850895"/>
             <a:ext cx="1632642" cy="369332"/>
           </a:xfrm>
           <a:prstGeom prst="rect">
@@ -10773,10 +10676,10 @@
           <a:lstStyle/>
           <a:p>
             <a:r>
-              <a:rPr lang="hr-HR"/>
+              <a:rPr lang="hr-HR" dirty="0"/>
               <a:t>ACTOR</a:t>
             </a:r>
-            <a:endParaRPr lang="en-US"/>
+            <a:endParaRPr lang="en-US" dirty="0"/>
           </a:p>
         </p:txBody>
       </p:sp>
@@ -10794,7 +10697,7 @@
         </p:nvSpPr>
         <p:spPr>
           <a:xfrm>
-            <a:off x="9189267" y="1855752"/>
+            <a:off x="7931967" y="4968228"/>
             <a:ext cx="1412341" cy="369332"/>
           </a:xfrm>
           <a:prstGeom prst="rect">
@@ -10809,10 +10712,10 @@
           <a:lstStyle/>
           <a:p>
             <a:r>
-              <a:rPr lang="hr-HR"/>
+              <a:rPr lang="hr-HR" dirty="0"/>
               <a:t>CRITIC</a:t>
             </a:r>
-            <a:endParaRPr lang="en-US"/>
+            <a:endParaRPr lang="en-US" dirty="0"/>
           </a:p>
         </p:txBody>
       </p:sp>
@@ -10892,7 +10795,7 @@
                             </p:stCondLst>
                             <p:childTnLst>
                               <p:par>
-                                <p:cTn id="9" presetID="1" presetClass="entr" presetSubtype="0" fill="hold" grpId="0" nodeType="clickEffect">
+                                <p:cTn id="9" presetID="1" presetClass="entr" presetSubtype="0" fill="hold" nodeType="clickEffect">
                                   <p:stCondLst>
                                     <p:cond delay="0"/>
                                   </p:stCondLst>
@@ -10900,300 +10803,6 @@
                                     <p:set>
                                       <p:cBhvr>
                                         <p:cTn id="10" dur="1" fill="hold">
-                                          <p:stCondLst>
-                                            <p:cond delay="0"/>
-                                          </p:stCondLst>
-                                        </p:cTn>
-                                        <p:tgtEl>
-                                          <p:spTgt spid="9">
-                                            <p:txEl>
-                                              <p:pRg st="0" end="0"/>
-                                            </p:txEl>
-                                          </p:spTgt>
-                                        </p:tgtEl>
-                                        <p:attrNameLst>
-                                          <p:attrName>style.visibility</p:attrName>
-                                        </p:attrNameLst>
-                                      </p:cBhvr>
-                                      <p:to>
-                                        <p:strVal val="visible"/>
-                                      </p:to>
-                                    </p:set>
-                                  </p:childTnLst>
-                                </p:cTn>
-                              </p:par>
-                            </p:childTnLst>
-                          </p:cTn>
-                        </p:par>
-                      </p:childTnLst>
-                    </p:cTn>
-                  </p:par>
-                  <p:par>
-                    <p:cTn id="11" fill="hold">
-                      <p:stCondLst>
-                        <p:cond delay="indefinite"/>
-                      </p:stCondLst>
-                      <p:childTnLst>
-                        <p:par>
-                          <p:cTn id="12" fill="hold">
-                            <p:stCondLst>
-                              <p:cond delay="0"/>
-                            </p:stCondLst>
-                            <p:childTnLst>
-                              <p:par>
-                                <p:cTn id="13" presetID="1" presetClass="entr" presetSubtype="0" fill="hold" grpId="0" nodeType="clickEffect">
-                                  <p:stCondLst>
-                                    <p:cond delay="0"/>
-                                  </p:stCondLst>
-                                  <p:childTnLst>
-                                    <p:set>
-                                      <p:cBhvr>
-                                        <p:cTn id="14" dur="1" fill="hold">
-                                          <p:stCondLst>
-                                            <p:cond delay="0"/>
-                                          </p:stCondLst>
-                                        </p:cTn>
-                                        <p:tgtEl>
-                                          <p:spTgt spid="9">
-                                            <p:txEl>
-                                              <p:pRg st="2" end="2"/>
-                                            </p:txEl>
-                                          </p:spTgt>
-                                        </p:tgtEl>
-                                        <p:attrNameLst>
-                                          <p:attrName>style.visibility</p:attrName>
-                                        </p:attrNameLst>
-                                      </p:cBhvr>
-                                      <p:to>
-                                        <p:strVal val="visible"/>
-                                      </p:to>
-                                    </p:set>
-                                  </p:childTnLst>
-                                </p:cTn>
-                              </p:par>
-                            </p:childTnLst>
-                          </p:cTn>
-                        </p:par>
-                      </p:childTnLst>
-                    </p:cTn>
-                  </p:par>
-                  <p:par>
-                    <p:cTn id="15" fill="hold">
-                      <p:stCondLst>
-                        <p:cond delay="indefinite"/>
-                      </p:stCondLst>
-                      <p:childTnLst>
-                        <p:par>
-                          <p:cTn id="16" fill="hold">
-                            <p:stCondLst>
-                              <p:cond delay="0"/>
-                            </p:stCondLst>
-                            <p:childTnLst>
-                              <p:par>
-                                <p:cTn id="17" presetID="1" presetClass="entr" presetSubtype="0" fill="hold" grpId="0" nodeType="clickEffect">
-                                  <p:stCondLst>
-                                    <p:cond delay="0"/>
-                                  </p:stCondLst>
-                                  <p:childTnLst>
-                                    <p:set>
-                                      <p:cBhvr>
-                                        <p:cTn id="18" dur="1" fill="hold">
-                                          <p:stCondLst>
-                                            <p:cond delay="0"/>
-                                          </p:stCondLst>
-                                        </p:cTn>
-                                        <p:tgtEl>
-                                          <p:spTgt spid="9">
-                                            <p:txEl>
-                                              <p:pRg st="4" end="4"/>
-                                            </p:txEl>
-                                          </p:spTgt>
-                                        </p:tgtEl>
-                                        <p:attrNameLst>
-                                          <p:attrName>style.visibility</p:attrName>
-                                        </p:attrNameLst>
-                                      </p:cBhvr>
-                                      <p:to>
-                                        <p:strVal val="visible"/>
-                                      </p:to>
-                                    </p:set>
-                                  </p:childTnLst>
-                                </p:cTn>
-                              </p:par>
-                            </p:childTnLst>
-                          </p:cTn>
-                        </p:par>
-                      </p:childTnLst>
-                    </p:cTn>
-                  </p:par>
-                  <p:par>
-                    <p:cTn id="19" fill="hold">
-                      <p:stCondLst>
-                        <p:cond delay="indefinite"/>
-                      </p:stCondLst>
-                      <p:childTnLst>
-                        <p:par>
-                          <p:cTn id="20" fill="hold">
-                            <p:stCondLst>
-                              <p:cond delay="0"/>
-                            </p:stCondLst>
-                            <p:childTnLst>
-                              <p:par>
-                                <p:cTn id="21" presetID="1" presetClass="entr" presetSubtype="0" fill="hold" grpId="0" nodeType="clickEffect">
-                                  <p:stCondLst>
-                                    <p:cond delay="0"/>
-                                  </p:stCondLst>
-                                  <p:childTnLst>
-                                    <p:set>
-                                      <p:cBhvr>
-                                        <p:cTn id="22" dur="1" fill="hold">
-                                          <p:stCondLst>
-                                            <p:cond delay="0"/>
-                                          </p:stCondLst>
-                                        </p:cTn>
-                                        <p:tgtEl>
-                                          <p:spTgt spid="9">
-                                            <p:txEl>
-                                              <p:pRg st="6" end="6"/>
-                                            </p:txEl>
-                                          </p:spTgt>
-                                        </p:tgtEl>
-                                        <p:attrNameLst>
-                                          <p:attrName>style.visibility</p:attrName>
-                                        </p:attrNameLst>
-                                      </p:cBhvr>
-                                      <p:to>
-                                        <p:strVal val="visible"/>
-                                      </p:to>
-                                    </p:set>
-                                  </p:childTnLst>
-                                </p:cTn>
-                              </p:par>
-                            </p:childTnLst>
-                          </p:cTn>
-                        </p:par>
-                      </p:childTnLst>
-                    </p:cTn>
-                  </p:par>
-                  <p:par>
-                    <p:cTn id="23" fill="hold">
-                      <p:stCondLst>
-                        <p:cond delay="indefinite"/>
-                      </p:stCondLst>
-                      <p:childTnLst>
-                        <p:par>
-                          <p:cTn id="24" fill="hold">
-                            <p:stCondLst>
-                              <p:cond delay="0"/>
-                            </p:stCondLst>
-                            <p:childTnLst>
-                              <p:par>
-                                <p:cTn id="25" presetID="1" presetClass="entr" presetSubtype="0" fill="hold" grpId="0" nodeType="clickEffect">
-                                  <p:stCondLst>
-                                    <p:cond delay="0"/>
-                                  </p:stCondLst>
-                                  <p:childTnLst>
-                                    <p:set>
-                                      <p:cBhvr>
-                                        <p:cTn id="26" dur="1" fill="hold">
-                                          <p:stCondLst>
-                                            <p:cond delay="0"/>
-                                          </p:stCondLst>
-                                        </p:cTn>
-                                        <p:tgtEl>
-                                          <p:spTgt spid="9">
-                                            <p:txEl>
-                                              <p:pRg st="8" end="8"/>
-                                            </p:txEl>
-                                          </p:spTgt>
-                                        </p:tgtEl>
-                                        <p:attrNameLst>
-                                          <p:attrName>style.visibility</p:attrName>
-                                        </p:attrNameLst>
-                                      </p:cBhvr>
-                                      <p:to>
-                                        <p:strVal val="visible"/>
-                                      </p:to>
-                                    </p:set>
-                                  </p:childTnLst>
-                                </p:cTn>
-                              </p:par>
-                            </p:childTnLst>
-                          </p:cTn>
-                        </p:par>
-                      </p:childTnLst>
-                    </p:cTn>
-                  </p:par>
-                  <p:par>
-                    <p:cTn id="27" fill="hold">
-                      <p:stCondLst>
-                        <p:cond delay="indefinite"/>
-                      </p:stCondLst>
-                      <p:childTnLst>
-                        <p:par>
-                          <p:cTn id="28" fill="hold">
-                            <p:stCondLst>
-                              <p:cond delay="0"/>
-                            </p:stCondLst>
-                            <p:childTnLst>
-                              <p:par>
-                                <p:cTn id="29" presetID="1" presetClass="entr" presetSubtype="0" fill="hold" grpId="0" nodeType="clickEffect">
-                                  <p:stCondLst>
-                                    <p:cond delay="0"/>
-                                  </p:stCondLst>
-                                  <p:childTnLst>
-                                    <p:set>
-                                      <p:cBhvr>
-                                        <p:cTn id="30" dur="1" fill="hold">
-                                          <p:stCondLst>
-                                            <p:cond delay="0"/>
-                                          </p:stCondLst>
-                                        </p:cTn>
-                                        <p:tgtEl>
-                                          <p:spTgt spid="9">
-                                            <p:txEl>
-                                              <p:pRg st="10" end="10"/>
-                                            </p:txEl>
-                                          </p:spTgt>
-                                        </p:tgtEl>
-                                        <p:attrNameLst>
-                                          <p:attrName>style.visibility</p:attrName>
-                                        </p:attrNameLst>
-                                      </p:cBhvr>
-                                      <p:to>
-                                        <p:strVal val="visible"/>
-                                      </p:to>
-                                    </p:set>
-                                  </p:childTnLst>
-                                </p:cTn>
-                              </p:par>
-                            </p:childTnLst>
-                          </p:cTn>
-                        </p:par>
-                      </p:childTnLst>
-                    </p:cTn>
-                  </p:par>
-                  <p:par>
-                    <p:cTn id="31" fill="hold">
-                      <p:stCondLst>
-                        <p:cond delay="indefinite"/>
-                      </p:stCondLst>
-                      <p:childTnLst>
-                        <p:par>
-                          <p:cTn id="32" fill="hold">
-                            <p:stCondLst>
-                              <p:cond delay="0"/>
-                            </p:stCondLst>
-                            <p:childTnLst>
-                              <p:par>
-                                <p:cTn id="33" presetID="1" presetClass="entr" presetSubtype="0" fill="hold" nodeType="clickEffect">
-                                  <p:stCondLst>
-                                    <p:cond delay="0"/>
-                                  </p:stCondLst>
-                                  <p:childTnLst>
-                                    <p:set>
-                                      <p:cBhvr>
-                                        <p:cTn id="34" dur="1" fill="hold">
                                           <p:stCondLst>
                                             <p:cond delay="0"/>
                                           </p:stCondLst>
@@ -11213,14 +10822,14 @@
                                 </p:cTn>
                               </p:par>
                               <p:par>
-                                <p:cTn id="35" presetID="1" presetClass="entr" presetSubtype="0" fill="hold" nodeType="withEffect">
+                                <p:cTn id="11" presetID="1" presetClass="entr" presetSubtype="0" fill="hold" nodeType="withEffect">
                                   <p:stCondLst>
                                     <p:cond delay="0"/>
                                   </p:stCondLst>
                                   <p:childTnLst>
                                     <p:set>
                                       <p:cBhvr>
-                                        <p:cTn id="36" dur="1" fill="hold">
+                                        <p:cTn id="12" dur="1" fill="hold">
                                           <p:stCondLst>
                                             <p:cond delay="0"/>
                                           </p:stCondLst>
@@ -11246,26 +10855,26 @@
                     </p:cTn>
                   </p:par>
                   <p:par>
-                    <p:cTn id="37" fill="hold">
+                    <p:cTn id="13" fill="hold">
                       <p:stCondLst>
                         <p:cond delay="indefinite"/>
                       </p:stCondLst>
                       <p:childTnLst>
                         <p:par>
-                          <p:cTn id="38" fill="hold">
+                          <p:cTn id="14" fill="hold">
                             <p:stCondLst>
                               <p:cond delay="0"/>
                             </p:stCondLst>
                             <p:childTnLst>
                               <p:par>
-                                <p:cTn id="39" presetID="1" presetClass="entr" presetSubtype="0" fill="hold" nodeType="clickEffect">
+                                <p:cTn id="15" presetID="1" presetClass="entr" presetSubtype="0" fill="hold" nodeType="clickEffect">
                                   <p:stCondLst>
                                     <p:cond delay="0"/>
                                   </p:stCondLst>
                                   <p:childTnLst>
                                     <p:set>
                                       <p:cBhvr>
-                                        <p:cTn id="40" dur="1" fill="hold">
+                                        <p:cTn id="16" dur="1" fill="hold">
                                           <p:stCondLst>
                                             <p:cond delay="0"/>
                                           </p:stCondLst>
@@ -11295,26 +10904,26 @@
                     </p:cTn>
                   </p:par>
                   <p:par>
-                    <p:cTn id="41" fill="hold">
+                    <p:cTn id="17" fill="hold">
                       <p:stCondLst>
                         <p:cond delay="indefinite"/>
                       </p:stCondLst>
                       <p:childTnLst>
                         <p:par>
-                          <p:cTn id="42" fill="hold">
+                          <p:cTn id="18" fill="hold">
                             <p:stCondLst>
                               <p:cond delay="0"/>
                             </p:stCondLst>
                             <p:childTnLst>
                               <p:par>
-                                <p:cTn id="43" presetID="1" presetClass="entr" presetSubtype="0" fill="hold" grpId="0" nodeType="clickEffect">
+                                <p:cTn id="19" presetID="1" presetClass="entr" presetSubtype="0" fill="hold" grpId="0" nodeType="clickEffect">
                                   <p:stCondLst>
                                     <p:cond delay="0"/>
                                   </p:stCondLst>
                                   <p:childTnLst>
                                     <p:set>
                                       <p:cBhvr>
-                                        <p:cTn id="44" dur="1" fill="hold">
+                                        <p:cTn id="20" dur="1" fill="hold">
                                           <p:stCondLst>
                                             <p:cond delay="0"/>
                                           </p:stCondLst>
@@ -11362,7 +10971,6 @@
     </p:tnLst>
     <p:bldLst>
       <p:bldP spid="11" grpId="0"/>
-      <p:bldP spid="9" grpId="0" build="p"/>
       <p:bldP spid="29" grpId="0"/>
     </p:bldLst>
   </p:timing>
@@ -13061,6 +12669,21 @@
 </file>
 
 <file path=customXml/item1.xml><?xml version="1.0" encoding="utf-8"?>
+<p:properties xmlns:p="http://schemas.microsoft.com/office/2006/metadata/properties" xmlns:xsi="http://www.w3.org/2001/XMLSchema-instance" xmlns:pc="http://schemas.microsoft.com/office/infopath/2007/PartnerControls">
+  <documentManagement/>
+</p:properties>
+</file>
+
+<file path=customXml/item2.xml><?xml version="1.0" encoding="utf-8"?>
+<?mso-contentType ?>
+<FormTemplates xmlns="http://schemas.microsoft.com/sharepoint/v3/contenttype/forms">
+  <Display>DocumentLibraryForm</Display>
+  <Edit>DocumentLibraryForm</Edit>
+  <New>DocumentLibraryForm</New>
+</FormTemplates>
+</file>
+
+<file path=customXml/item3.xml><?xml version="1.0" encoding="utf-8"?>
 <ct:contentTypeSchema xmlns:ct="http://schemas.microsoft.com/office/2006/metadata/contentType" xmlns:ma="http://schemas.microsoft.com/office/2006/metadata/properties/metaAttributes" ct:_="" ma:_="" ma:contentTypeName="Document" ma:contentTypeID="0x0101000E03F8D96A829C48A563122BBD8879B3" ma:contentTypeVersion="2" ma:contentTypeDescription="Create a new document." ma:contentTypeScope="" ma:versionID="4a0058485877f2efba9b5f0ba18a6cd9">
   <xsd:schema xmlns:xsd="http://www.w3.org/2001/XMLSchema" xmlns:xs="http://www.w3.org/2001/XMLSchema" xmlns:p="http://schemas.microsoft.com/office/2006/metadata/properties" xmlns:ns3="5684b074-b83b-4d13-a5b3-458f1992cc57" targetNamespace="http://schemas.microsoft.com/office/2006/metadata/properties" ma:root="true" ma:fieldsID="f9a3f780c86eeee65d11c0ebb09631cf" ns3:_="">
     <xsd:import namespace="5684b074-b83b-4d13-a5b3-458f1992cc57"/>
@@ -13192,22 +12815,31 @@
 </ct:contentTypeSchema>
 </file>
 
-<file path=customXml/item2.xml><?xml version="1.0" encoding="utf-8"?>
-<?mso-contentType ?>
-<FormTemplates xmlns="http://schemas.microsoft.com/sharepoint/v3/contenttype/forms">
-  <Display>DocumentLibraryForm</Display>
-  <Edit>DocumentLibraryForm</Edit>
-  <New>DocumentLibraryForm</New>
-</FormTemplates>
+<file path=customXml/itemProps1.xml><?xml version="1.0" encoding="utf-8"?>
+<ds:datastoreItem xmlns:ds="http://schemas.openxmlformats.org/officeDocument/2006/customXml" ds:itemID="{201FE162-F67F-4088-9FEE-E3BF16338607}">
+  <ds:schemaRefs>
+    <ds:schemaRef ds:uri="http://purl.org/dc/dcmitype/"/>
+    <ds:schemaRef ds:uri="5684b074-b83b-4d13-a5b3-458f1992cc57"/>
+    <ds:schemaRef ds:uri="http://purl.org/dc/elements/1.1/"/>
+    <ds:schemaRef ds:uri="http://schemas.microsoft.com/office/2006/metadata/properties"/>
+    <ds:schemaRef ds:uri="http://schemas.microsoft.com/office/2006/documentManagement/types"/>
+    <ds:schemaRef ds:uri="http://purl.org/dc/terms/"/>
+    <ds:schemaRef ds:uri="http://schemas.openxmlformats.org/package/2006/metadata/core-properties"/>
+    <ds:schemaRef ds:uri="http://schemas.microsoft.com/office/infopath/2007/PartnerControls"/>
+    <ds:schemaRef ds:uri="http://www.w3.org/XML/1998/namespace"/>
+  </ds:schemaRefs>
+</ds:datastoreItem>
 </file>
 
-<file path=customXml/item3.xml><?xml version="1.0" encoding="utf-8"?>
-<p:properties xmlns:p="http://schemas.microsoft.com/office/2006/metadata/properties" xmlns:xsi="http://www.w3.org/2001/XMLSchema-instance" xmlns:pc="http://schemas.microsoft.com/office/infopath/2007/PartnerControls">
-  <documentManagement/>
-</p:properties>
+<file path=customXml/itemProps2.xml><?xml version="1.0" encoding="utf-8"?>
+<ds:datastoreItem xmlns:ds="http://schemas.openxmlformats.org/officeDocument/2006/customXml" ds:itemID="{5E8B0DC0-DC77-4E67-B5AB-F10CB9E90A42}">
+  <ds:schemaRefs>
+    <ds:schemaRef ds:uri="http://schemas.microsoft.com/sharepoint/v3/contenttype/forms"/>
+  </ds:schemaRefs>
+</ds:datastoreItem>
 </file>
 
-<file path=customXml/itemProps1.xml><?xml version="1.0" encoding="utf-8"?>
+<file path=customXml/itemProps3.xml><?xml version="1.0" encoding="utf-8"?>
 <ds:datastoreItem xmlns:ds="http://schemas.openxmlformats.org/officeDocument/2006/customXml" ds:itemID="{AD358887-5107-4F51-8C58-C59A9AA4D16D}">
   <ds:schemaRefs>
     <ds:schemaRef ds:uri="5684b074-b83b-4d13-a5b3-458f1992cc57"/>
@@ -13223,28 +12855,4 @@
     <ds:schemaRef ds:uri="http://www.w3.org/2001/XMLSchema"/>
   </ds:schemaRefs>
 </ds:datastoreItem>
-</file>
-
-<file path=customXml/itemProps2.xml><?xml version="1.0" encoding="utf-8"?>
-<ds:datastoreItem xmlns:ds="http://schemas.openxmlformats.org/officeDocument/2006/customXml" ds:itemID="{5E8B0DC0-DC77-4E67-B5AB-F10CB9E90A42}">
-  <ds:schemaRefs>
-    <ds:schemaRef ds:uri="http://schemas.microsoft.com/sharepoint/v3/contenttype/forms"/>
-  </ds:schemaRefs>
-</ds:datastoreItem>
-</file>
-
-<file path=customXml/itemProps3.xml><?xml version="1.0" encoding="utf-8"?>
-<ds:datastoreItem xmlns:ds="http://schemas.openxmlformats.org/officeDocument/2006/customXml" ds:itemID="{201FE162-F67F-4088-9FEE-E3BF16338607}">
-  <ds:schemaRefs>
-    <ds:schemaRef ds:uri="http://purl.org/dc/dcmitype/"/>
-    <ds:schemaRef ds:uri="5684b074-b83b-4d13-a5b3-458f1992cc57"/>
-    <ds:schemaRef ds:uri="http://purl.org/dc/elements/1.1/"/>
-    <ds:schemaRef ds:uri="http://schemas.microsoft.com/office/2006/metadata/properties"/>
-    <ds:schemaRef ds:uri="http://schemas.microsoft.com/office/2006/documentManagement/types"/>
-    <ds:schemaRef ds:uri="http://purl.org/dc/terms/"/>
-    <ds:schemaRef ds:uri="http://schemas.openxmlformats.org/package/2006/metadata/core-properties"/>
-    <ds:schemaRef ds:uri="http://schemas.microsoft.com/office/infopath/2007/PartnerControls"/>
-    <ds:schemaRef ds:uri="http://www.w3.org/XML/1998/namespace"/>
-  </ds:schemaRefs>
-</ds:datastoreItem>
 </file>
</xml_diff>